<commit_message>
Quiz Sistema de Recomendación
</commit_message>
<xml_diff>
--- a/Tutoriales/Week5/data/sistemas_recomendacion.pptx
+++ b/Tutoriales/Week5/data/sistemas_recomendacion.pptx
@@ -11,6 +11,7 @@
     <p:sldId id="259" r:id="rId5"/>
     <p:sldId id="260" r:id="rId6"/>
     <p:sldId id="261" r:id="rId7"/>
+    <p:sldId id="262" r:id="rId8"/>
   </p:sldIdLst>
   <p:sldSz cx="12192000" cy="6858000"/>
   <p:notesSz cx="6858000" cy="9144000"/>
@@ -120,7 +121,7 @@
 <file path=ppt/revisionInfo.xml><?xml version="1.0" encoding="utf-8"?>
 <p1510:revInfo xmlns:a="http://schemas.openxmlformats.org/drawingml/2006/main" xmlns:r="http://schemas.openxmlformats.org/officeDocument/2006/relationships" xmlns:p1510="http://schemas.microsoft.com/office/powerpoint/2015/10/main">
   <p1510:revLst>
-    <p1510:client id="{CB10C1B0-283E-4DDF-8C89-9FF28519B6C1}" v="65" dt="2022-04-07T04:27:38.888"/>
+    <p1510:client id="{CB10C1B0-283E-4DDF-8C89-9FF28519B6C1}" v="75" dt="2022-04-11T04:22:22.136"/>
   </p1510:revLst>
 </p1510:revInfo>
 </file>
@@ -130,7 +131,7 @@
   <pc:docChgLst>
     <pc:chgData name="Lucas  Gomez Tobon" userId="b8a6d8fe-e4ad-4825-8cc6-ab3fedc37e7a" providerId="ADAL" clId="{CB10C1B0-283E-4DDF-8C89-9FF28519B6C1}"/>
     <pc:docChg chg="undo custSel addSld modSld">
-      <pc:chgData name="Lucas  Gomez Tobon" userId="b8a6d8fe-e4ad-4825-8cc6-ab3fedc37e7a" providerId="ADAL" clId="{CB10C1B0-283E-4DDF-8C89-9FF28519B6C1}" dt="2022-04-07T04:27:47.788" v="635" actId="14100"/>
+      <pc:chgData name="Lucas  Gomez Tobon" userId="b8a6d8fe-e4ad-4825-8cc6-ab3fedc37e7a" providerId="ADAL" clId="{CB10C1B0-283E-4DDF-8C89-9FF28519B6C1}" dt="2022-04-11T04:22:22.135" v="700" actId="164"/>
       <pc:docMkLst>
         <pc:docMk/>
       </pc:docMkLst>
@@ -893,6 +894,101 @@
             <pc:docMk/>
             <pc:sldMk cId="1820728162" sldId="261"/>
             <ac:picMk id="11" creationId="{EEE4DE07-7D38-4ED0-B823-3785BACB94E7}"/>
+          </ac:picMkLst>
+        </pc:picChg>
+      </pc:sldChg>
+      <pc:sldChg chg="addSp delSp modSp new mod">
+        <pc:chgData name="Lucas  Gomez Tobon" userId="b8a6d8fe-e4ad-4825-8cc6-ab3fedc37e7a" providerId="ADAL" clId="{CB10C1B0-283E-4DDF-8C89-9FF28519B6C1}" dt="2022-04-11T04:22:22.135" v="700" actId="164"/>
+        <pc:sldMkLst>
+          <pc:docMk/>
+          <pc:sldMk cId="1441197685" sldId="262"/>
+        </pc:sldMkLst>
+        <pc:spChg chg="del">
+          <ac:chgData name="Lucas  Gomez Tobon" userId="b8a6d8fe-e4ad-4825-8cc6-ab3fedc37e7a" providerId="ADAL" clId="{CB10C1B0-283E-4DDF-8C89-9FF28519B6C1}" dt="2022-04-11T04:20:52.860" v="638" actId="478"/>
+          <ac:spMkLst>
+            <pc:docMk/>
+            <pc:sldMk cId="1441197685" sldId="262"/>
+            <ac:spMk id="2" creationId="{2DA4FCED-DF90-4AFA-B742-F78C107DEBDC}"/>
+          </ac:spMkLst>
+        </pc:spChg>
+        <pc:spChg chg="del">
+          <ac:chgData name="Lucas  Gomez Tobon" userId="b8a6d8fe-e4ad-4825-8cc6-ab3fedc37e7a" providerId="ADAL" clId="{CB10C1B0-283E-4DDF-8C89-9FF28519B6C1}" dt="2022-04-11T04:20:50.690" v="637"/>
+          <ac:spMkLst>
+            <pc:docMk/>
+            <pc:sldMk cId="1441197685" sldId="262"/>
+            <ac:spMk id="3" creationId="{D406CCA0-AB19-46C6-99F7-D05987F93CB4}"/>
+          </ac:spMkLst>
+        </pc:spChg>
+        <pc:spChg chg="add del mod">
+          <ac:chgData name="Lucas  Gomez Tobon" userId="b8a6d8fe-e4ad-4825-8cc6-ab3fedc37e7a" providerId="ADAL" clId="{CB10C1B0-283E-4DDF-8C89-9FF28519B6C1}" dt="2022-04-11T04:20:54.310" v="639" actId="478"/>
+          <ac:spMkLst>
+            <pc:docMk/>
+            <pc:sldMk cId="1441197685" sldId="262"/>
+            <ac:spMk id="4" creationId="{211379A8-57ED-43EC-8A8E-EFA51CBDAF9A}"/>
+          </ac:spMkLst>
+        </pc:spChg>
+        <pc:spChg chg="add del">
+          <ac:chgData name="Lucas  Gomez Tobon" userId="b8a6d8fe-e4ad-4825-8cc6-ab3fedc37e7a" providerId="ADAL" clId="{CB10C1B0-283E-4DDF-8C89-9FF28519B6C1}" dt="2022-04-11T04:21:01.788" v="641"/>
+          <ac:spMkLst>
+            <pc:docMk/>
+            <pc:sldMk cId="1441197685" sldId="262"/>
+            <ac:spMk id="5" creationId="{816423C4-3BA4-4454-84D0-7FD9A58669D8}"/>
+          </ac:spMkLst>
+        </pc:spChg>
+        <pc:spChg chg="add mod">
+          <ac:chgData name="Lucas  Gomez Tobon" userId="b8a6d8fe-e4ad-4825-8cc6-ab3fedc37e7a" providerId="ADAL" clId="{CB10C1B0-283E-4DDF-8C89-9FF28519B6C1}" dt="2022-04-11T04:22:22.135" v="700" actId="164"/>
+          <ac:spMkLst>
+            <pc:docMk/>
+            <pc:sldMk cId="1441197685" sldId="262"/>
+            <ac:spMk id="8" creationId="{EDA89A3A-12E2-4389-B5A7-C5B8E5F22D5E}"/>
+          </ac:spMkLst>
+        </pc:spChg>
+        <pc:spChg chg="add mod">
+          <ac:chgData name="Lucas  Gomez Tobon" userId="b8a6d8fe-e4ad-4825-8cc6-ab3fedc37e7a" providerId="ADAL" clId="{CB10C1B0-283E-4DDF-8C89-9FF28519B6C1}" dt="2022-04-11T04:22:22.135" v="700" actId="164"/>
+          <ac:spMkLst>
+            <pc:docMk/>
+            <pc:sldMk cId="1441197685" sldId="262"/>
+            <ac:spMk id="9" creationId="{2ACE3D4F-A1FE-482E-9214-BB9654D0CE28}"/>
+          </ac:spMkLst>
+        </pc:spChg>
+        <pc:spChg chg="add mod">
+          <ac:chgData name="Lucas  Gomez Tobon" userId="b8a6d8fe-e4ad-4825-8cc6-ab3fedc37e7a" providerId="ADAL" clId="{CB10C1B0-283E-4DDF-8C89-9FF28519B6C1}" dt="2022-04-11T04:22:22.135" v="700" actId="164"/>
+          <ac:spMkLst>
+            <pc:docMk/>
+            <pc:sldMk cId="1441197685" sldId="262"/>
+            <ac:spMk id="10" creationId="{07869960-C371-4418-94F6-D436E4E55100}"/>
+          </ac:spMkLst>
+        </pc:spChg>
+        <pc:spChg chg="add mod">
+          <ac:chgData name="Lucas  Gomez Tobon" userId="b8a6d8fe-e4ad-4825-8cc6-ab3fedc37e7a" providerId="ADAL" clId="{CB10C1B0-283E-4DDF-8C89-9FF28519B6C1}" dt="2022-04-11T04:22:22.135" v="700" actId="164"/>
+          <ac:spMkLst>
+            <pc:docMk/>
+            <pc:sldMk cId="1441197685" sldId="262"/>
+            <ac:spMk id="11" creationId="{3FC5F9C8-7445-4366-ADC7-FB4A548F2D46}"/>
+          </ac:spMkLst>
+        </pc:spChg>
+        <pc:spChg chg="add mod ord">
+          <ac:chgData name="Lucas  Gomez Tobon" userId="b8a6d8fe-e4ad-4825-8cc6-ab3fedc37e7a" providerId="ADAL" clId="{CB10C1B0-283E-4DDF-8C89-9FF28519B6C1}" dt="2022-04-11T04:22:22.135" v="700" actId="164"/>
+          <ac:spMkLst>
+            <pc:docMk/>
+            <pc:sldMk cId="1441197685" sldId="262"/>
+            <ac:spMk id="12" creationId="{14B0F146-552B-40E5-8C05-0B82A525AFE9}"/>
+          </ac:spMkLst>
+        </pc:spChg>
+        <pc:grpChg chg="add mod">
+          <ac:chgData name="Lucas  Gomez Tobon" userId="b8a6d8fe-e4ad-4825-8cc6-ab3fedc37e7a" providerId="ADAL" clId="{CB10C1B0-283E-4DDF-8C89-9FF28519B6C1}" dt="2022-04-11T04:22:22.135" v="700" actId="164"/>
+          <ac:grpSpMkLst>
+            <pc:docMk/>
+            <pc:sldMk cId="1441197685" sldId="262"/>
+            <ac:grpSpMk id="13" creationId="{884D210A-3B83-4819-919B-9C79D0DDC105}"/>
+          </ac:grpSpMkLst>
+        </pc:grpChg>
+        <pc:picChg chg="add mod">
+          <ac:chgData name="Lucas  Gomez Tobon" userId="b8a6d8fe-e4ad-4825-8cc6-ab3fedc37e7a" providerId="ADAL" clId="{CB10C1B0-283E-4DDF-8C89-9FF28519B6C1}" dt="2022-04-11T04:22:22.135" v="700" actId="164"/>
+          <ac:picMkLst>
+            <pc:docMk/>
+            <pc:sldMk cId="1441197685" sldId="262"/>
+            <ac:picMk id="7" creationId="{470E7462-367C-4E30-830E-81CA626495C1}"/>
           </ac:picMkLst>
         </pc:picChg>
       </pc:sldChg>
@@ -1050,7 +1146,7 @@
           <a:p>
             <a:fld id="{02A4F55A-5034-452D-B27B-AB987101B215}" type="datetimeFigureOut">
               <a:rPr lang="es-CO" smtClean="0"/>
-              <a:t>6/04/2022</a:t>
+              <a:t>10/04/2022</a:t>
             </a:fld>
             <a:endParaRPr lang="es-CO"/>
           </a:p>
@@ -1250,7 +1346,7 @@
           <a:p>
             <a:fld id="{02A4F55A-5034-452D-B27B-AB987101B215}" type="datetimeFigureOut">
               <a:rPr lang="es-CO" smtClean="0"/>
-              <a:t>6/04/2022</a:t>
+              <a:t>10/04/2022</a:t>
             </a:fld>
             <a:endParaRPr lang="es-CO"/>
           </a:p>
@@ -1460,7 +1556,7 @@
           <a:p>
             <a:fld id="{02A4F55A-5034-452D-B27B-AB987101B215}" type="datetimeFigureOut">
               <a:rPr lang="es-CO" smtClean="0"/>
-              <a:t>6/04/2022</a:t>
+              <a:t>10/04/2022</a:t>
             </a:fld>
             <a:endParaRPr lang="es-CO"/>
           </a:p>
@@ -1660,7 +1756,7 @@
           <a:p>
             <a:fld id="{02A4F55A-5034-452D-B27B-AB987101B215}" type="datetimeFigureOut">
               <a:rPr lang="es-CO" smtClean="0"/>
-              <a:t>6/04/2022</a:t>
+              <a:t>10/04/2022</a:t>
             </a:fld>
             <a:endParaRPr lang="es-CO"/>
           </a:p>
@@ -1936,7 +2032,7 @@
           <a:p>
             <a:fld id="{02A4F55A-5034-452D-B27B-AB987101B215}" type="datetimeFigureOut">
               <a:rPr lang="es-CO" smtClean="0"/>
-              <a:t>6/04/2022</a:t>
+              <a:t>10/04/2022</a:t>
             </a:fld>
             <a:endParaRPr lang="es-CO"/>
           </a:p>
@@ -2204,7 +2300,7 @@
           <a:p>
             <a:fld id="{02A4F55A-5034-452D-B27B-AB987101B215}" type="datetimeFigureOut">
               <a:rPr lang="es-CO" smtClean="0"/>
-              <a:t>6/04/2022</a:t>
+              <a:t>10/04/2022</a:t>
             </a:fld>
             <a:endParaRPr lang="es-CO"/>
           </a:p>
@@ -2619,7 +2715,7 @@
           <a:p>
             <a:fld id="{02A4F55A-5034-452D-B27B-AB987101B215}" type="datetimeFigureOut">
               <a:rPr lang="es-CO" smtClean="0"/>
-              <a:t>6/04/2022</a:t>
+              <a:t>10/04/2022</a:t>
             </a:fld>
             <a:endParaRPr lang="es-CO"/>
           </a:p>
@@ -2761,7 +2857,7 @@
           <a:p>
             <a:fld id="{02A4F55A-5034-452D-B27B-AB987101B215}" type="datetimeFigureOut">
               <a:rPr lang="es-CO" smtClean="0"/>
-              <a:t>6/04/2022</a:t>
+              <a:t>10/04/2022</a:t>
             </a:fld>
             <a:endParaRPr lang="es-CO"/>
           </a:p>
@@ -2874,7 +2970,7 @@
           <a:p>
             <a:fld id="{02A4F55A-5034-452D-B27B-AB987101B215}" type="datetimeFigureOut">
               <a:rPr lang="es-CO" smtClean="0"/>
-              <a:t>6/04/2022</a:t>
+              <a:t>10/04/2022</a:t>
             </a:fld>
             <a:endParaRPr lang="es-CO"/>
           </a:p>
@@ -3187,7 +3283,7 @@
           <a:p>
             <a:fld id="{02A4F55A-5034-452D-B27B-AB987101B215}" type="datetimeFigureOut">
               <a:rPr lang="es-CO" smtClean="0"/>
-              <a:t>6/04/2022</a:t>
+              <a:t>10/04/2022</a:t>
             </a:fld>
             <a:endParaRPr lang="es-CO"/>
           </a:p>
@@ -3476,7 +3572,7 @@
           <a:p>
             <a:fld id="{02A4F55A-5034-452D-B27B-AB987101B215}" type="datetimeFigureOut">
               <a:rPr lang="es-CO" smtClean="0"/>
-              <a:t>6/04/2022</a:t>
+              <a:t>10/04/2022</a:t>
             </a:fld>
             <a:endParaRPr lang="es-CO"/>
           </a:p>
@@ -3719,7 +3815,7 @@
           <a:p>
             <a:fld id="{02A4F55A-5034-452D-B27B-AB987101B215}" type="datetimeFigureOut">
               <a:rPr lang="es-CO" smtClean="0"/>
-              <a:t>6/04/2022</a:t>
+              <a:t>10/04/2022</a:t>
             </a:fld>
             <a:endParaRPr lang="es-CO"/>
           </a:p>
@@ -7538,6 +7634,302 @@
 </p:sld>
 </file>
 
+<file path=ppt/slides/slide7.xml><?xml version="1.0" encoding="utf-8"?>
+<p:sld xmlns:a="http://schemas.openxmlformats.org/drawingml/2006/main" xmlns:r="http://schemas.openxmlformats.org/officeDocument/2006/relationships" xmlns:p="http://schemas.openxmlformats.org/presentationml/2006/main">
+  <p:cSld>
+    <p:spTree>
+      <p:nvGrpSpPr>
+        <p:cNvPr id="1" name=""/>
+        <p:cNvGrpSpPr/>
+        <p:nvPr/>
+      </p:nvGrpSpPr>
+      <p:grpSpPr>
+        <a:xfrm>
+          <a:off x="0" y="0"/>
+          <a:ext cx="0" cy="0"/>
+          <a:chOff x="0" y="0"/>
+          <a:chExt cx="0" cy="0"/>
+        </a:xfrm>
+      </p:grpSpPr>
+      <p:grpSp>
+        <p:nvGrpSpPr>
+          <p:cNvPr id="13" name="Grupo 12">
+            <a:extLst>
+              <a:ext uri="{FF2B5EF4-FFF2-40B4-BE49-F238E27FC236}">
+                <a16:creationId xmlns:a16="http://schemas.microsoft.com/office/drawing/2014/main" id="{884D210A-3B83-4819-919B-9C79D0DDC105}"/>
+              </a:ext>
+            </a:extLst>
+          </p:cNvPr>
+          <p:cNvGrpSpPr/>
+          <p:nvPr/>
+        </p:nvGrpSpPr>
+        <p:grpSpPr>
+          <a:xfrm>
+            <a:off x="1243584" y="525780"/>
+            <a:ext cx="9573392" cy="5806440"/>
+            <a:chOff x="1243584" y="525780"/>
+            <a:chExt cx="9573392" cy="5806440"/>
+          </a:xfrm>
+        </p:grpSpPr>
+        <p:sp>
+          <p:nvSpPr>
+            <p:cNvPr id="12" name="Rectángulo 11">
+              <a:extLst>
+                <a:ext uri="{FF2B5EF4-FFF2-40B4-BE49-F238E27FC236}">
+                  <a16:creationId xmlns:a16="http://schemas.microsoft.com/office/drawing/2014/main" id="{14B0F146-552B-40E5-8C05-0B82A525AFE9}"/>
+                </a:ext>
+              </a:extLst>
+            </p:cNvPr>
+            <p:cNvSpPr/>
+            <p:nvPr/>
+          </p:nvSpPr>
+          <p:spPr>
+            <a:xfrm>
+              <a:off x="1243584" y="525780"/>
+              <a:ext cx="9573392" cy="5806440"/>
+            </a:xfrm>
+            <a:prstGeom prst="rect">
+              <a:avLst/>
+            </a:prstGeom>
+            <a:solidFill>
+              <a:schemeClr val="bg1"/>
+            </a:solidFill>
+            <a:ln>
+              <a:solidFill>
+                <a:schemeClr val="bg1"/>
+              </a:solidFill>
+            </a:ln>
+          </p:spPr>
+          <p:style>
+            <a:lnRef idx="2">
+              <a:schemeClr val="accent1">
+                <a:shade val="50000"/>
+              </a:schemeClr>
+            </a:lnRef>
+            <a:fillRef idx="1">
+              <a:schemeClr val="accent1"/>
+            </a:fillRef>
+            <a:effectRef idx="0">
+              <a:schemeClr val="accent1"/>
+            </a:effectRef>
+            <a:fontRef idx="minor">
+              <a:schemeClr val="lt1"/>
+            </a:fontRef>
+          </p:style>
+          <p:txBody>
+            <a:bodyPr rtlCol="0" anchor="ctr"/>
+            <a:lstStyle/>
+            <a:p>
+              <a:pPr algn="ctr"/>
+              <a:endParaRPr lang="es-CO" dirty="0"/>
+            </a:p>
+          </p:txBody>
+        </p:sp>
+        <p:pic>
+          <p:nvPicPr>
+            <p:cNvPr id="7" name="Imagen 6">
+              <a:extLst>
+                <a:ext uri="{FF2B5EF4-FFF2-40B4-BE49-F238E27FC236}">
+                  <a16:creationId xmlns:a16="http://schemas.microsoft.com/office/drawing/2014/main" id="{470E7462-367C-4E30-830E-81CA626495C1}"/>
+                </a:ext>
+              </a:extLst>
+            </p:cNvPr>
+            <p:cNvPicPr>
+              <a:picLocks noChangeAspect="1"/>
+            </p:cNvPicPr>
+            <p:nvPr/>
+          </p:nvPicPr>
+          <p:blipFill>
+            <a:blip r:embed="rId2"/>
+            <a:stretch>
+              <a:fillRect/>
+            </a:stretch>
+          </p:blipFill>
+          <p:spPr>
+            <a:xfrm>
+              <a:off x="3534002" y="1329002"/>
+              <a:ext cx="5123995" cy="4199995"/>
+            </a:xfrm>
+            <a:prstGeom prst="rect">
+              <a:avLst/>
+            </a:prstGeom>
+          </p:spPr>
+        </p:pic>
+        <p:sp>
+          <p:nvSpPr>
+            <p:cNvPr id="8" name="CuadroTexto 7">
+              <a:extLst>
+                <a:ext uri="{FF2B5EF4-FFF2-40B4-BE49-F238E27FC236}">
+                  <a16:creationId xmlns:a16="http://schemas.microsoft.com/office/drawing/2014/main" id="{EDA89A3A-12E2-4389-B5A7-C5B8E5F22D5E}"/>
+                </a:ext>
+              </a:extLst>
+            </p:cNvPr>
+            <p:cNvSpPr txBox="1"/>
+            <p:nvPr/>
+          </p:nvSpPr>
+          <p:spPr>
+            <a:xfrm>
+              <a:off x="7699248" y="1329002"/>
+              <a:ext cx="1691640" cy="369332"/>
+            </a:xfrm>
+            <a:prstGeom prst="rect">
+              <a:avLst/>
+            </a:prstGeom>
+            <a:solidFill>
+              <a:schemeClr val="bg1"/>
+            </a:solidFill>
+            <a:ln>
+              <a:noFill/>
+            </a:ln>
+          </p:spPr>
+          <p:txBody>
+            <a:bodyPr wrap="square" rtlCol="0">
+              <a:spAutoFit/>
+            </a:bodyPr>
+            <a:lstStyle/>
+            <a:p>
+              <a:r>
+                <a:rPr lang="es-CO" dirty="0"/>
+                <a:t>Elemento A</a:t>
+              </a:r>
+            </a:p>
+          </p:txBody>
+        </p:sp>
+        <p:sp>
+          <p:nvSpPr>
+            <p:cNvPr id="9" name="CuadroTexto 8">
+              <a:extLst>
+                <a:ext uri="{FF2B5EF4-FFF2-40B4-BE49-F238E27FC236}">
+                  <a16:creationId xmlns:a16="http://schemas.microsoft.com/office/drawing/2014/main" id="{2ACE3D4F-A1FE-482E-9214-BB9654D0CE28}"/>
+                </a:ext>
+              </a:extLst>
+            </p:cNvPr>
+            <p:cNvSpPr txBox="1"/>
+            <p:nvPr/>
+          </p:nvSpPr>
+          <p:spPr>
+            <a:xfrm>
+              <a:off x="6242304" y="3428999"/>
+              <a:ext cx="1691640" cy="369332"/>
+            </a:xfrm>
+            <a:prstGeom prst="rect">
+              <a:avLst/>
+            </a:prstGeom>
+            <a:solidFill>
+              <a:schemeClr val="bg1"/>
+            </a:solidFill>
+            <a:ln>
+              <a:noFill/>
+            </a:ln>
+          </p:spPr>
+          <p:txBody>
+            <a:bodyPr wrap="square" rtlCol="0">
+              <a:spAutoFit/>
+            </a:bodyPr>
+            <a:lstStyle/>
+            <a:p>
+              <a:r>
+                <a:rPr lang="es-CO" dirty="0"/>
+                <a:t>Elemento B</a:t>
+              </a:r>
+            </a:p>
+          </p:txBody>
+        </p:sp>
+        <p:sp>
+          <p:nvSpPr>
+            <p:cNvPr id="10" name="CuadroTexto 9">
+              <a:extLst>
+                <a:ext uri="{FF2B5EF4-FFF2-40B4-BE49-F238E27FC236}">
+                  <a16:creationId xmlns:a16="http://schemas.microsoft.com/office/drawing/2014/main" id="{07869960-C371-4418-94F6-D436E4E55100}"/>
+                </a:ext>
+              </a:extLst>
+            </p:cNvPr>
+            <p:cNvSpPr txBox="1"/>
+            <p:nvPr/>
+          </p:nvSpPr>
+          <p:spPr>
+            <a:xfrm>
+              <a:off x="2801111" y="4258055"/>
+              <a:ext cx="1691640" cy="369332"/>
+            </a:xfrm>
+            <a:prstGeom prst="rect">
+              <a:avLst/>
+            </a:prstGeom>
+            <a:solidFill>
+              <a:schemeClr val="bg1"/>
+            </a:solidFill>
+            <a:ln>
+              <a:noFill/>
+            </a:ln>
+          </p:spPr>
+          <p:txBody>
+            <a:bodyPr wrap="square" rtlCol="0">
+              <a:spAutoFit/>
+            </a:bodyPr>
+            <a:lstStyle/>
+            <a:p>
+              <a:pPr algn="r"/>
+              <a:r>
+                <a:rPr lang="es-CO" dirty="0"/>
+                <a:t>Elemento C</a:t>
+              </a:r>
+            </a:p>
+          </p:txBody>
+        </p:sp>
+        <p:sp>
+          <p:nvSpPr>
+            <p:cNvPr id="11" name="CuadroTexto 10">
+              <a:extLst>
+                <a:ext uri="{FF2B5EF4-FFF2-40B4-BE49-F238E27FC236}">
+                  <a16:creationId xmlns:a16="http://schemas.microsoft.com/office/drawing/2014/main" id="{3FC5F9C8-7445-4366-ADC7-FB4A548F2D46}"/>
+                </a:ext>
+              </a:extLst>
+            </p:cNvPr>
+            <p:cNvSpPr txBox="1"/>
+            <p:nvPr/>
+          </p:nvSpPr>
+          <p:spPr>
+            <a:xfrm>
+              <a:off x="4977384" y="2694431"/>
+              <a:ext cx="1264920" cy="369332"/>
+            </a:xfrm>
+            <a:prstGeom prst="rect">
+              <a:avLst/>
+            </a:prstGeom>
+            <a:solidFill>
+              <a:schemeClr val="bg1"/>
+            </a:solidFill>
+            <a:ln>
+              <a:noFill/>
+            </a:ln>
+          </p:spPr>
+          <p:txBody>
+            <a:bodyPr wrap="square" rtlCol="0">
+              <a:spAutoFit/>
+            </a:bodyPr>
+            <a:lstStyle/>
+            <a:p>
+              <a:r>
+                <a:rPr lang="es-CO" dirty="0"/>
+                <a:t>Consulta</a:t>
+              </a:r>
+            </a:p>
+          </p:txBody>
+        </p:sp>
+      </p:grpSp>
+    </p:spTree>
+    <p:extLst>
+      <p:ext uri="{BB962C8B-B14F-4D97-AF65-F5344CB8AC3E}">
+        <p14:creationId xmlns:p14="http://schemas.microsoft.com/office/powerpoint/2010/main" val="1441197685"/>
+      </p:ext>
+    </p:extLst>
+  </p:cSld>
+  <p:clrMapOvr>
+    <a:masterClrMapping/>
+  </p:clrMapOvr>
+</p:sld>
+</file>
+
 <file path=ppt/theme/theme1.xml><?xml version="1.0" encoding="utf-8"?>
 <a:theme xmlns:a="http://schemas.openxmlformats.org/drawingml/2006/main" name="Tema de Office">
   <a:themeElements>

</xml_diff>